<commit_message>
Updated poster for household member illness
</commit_message>
<xml_diff>
--- a/HouseholdInfection/Household_English.pptx
+++ b/HouseholdInfection/Household_English.pptx
@@ -255,7 +255,7 @@
           <a:p>
             <a:fld id="{4F5A968B-4E26-4D02-9FB9-DF6E8F29BEFB}" type="datetimeFigureOut">
               <a:rPr lang="en-US" smtClean="0"/>
-              <a:t>4/1/2020</a:t>
+              <a:t>4/2/2020</a:t>
             </a:fld>
             <a:endParaRPr lang="en-US"/>
           </a:p>
@@ -425,7 +425,7 @@
           <a:p>
             <a:fld id="{4F5A968B-4E26-4D02-9FB9-DF6E8F29BEFB}" type="datetimeFigureOut">
               <a:rPr lang="en-US" smtClean="0"/>
-              <a:t>4/1/2020</a:t>
+              <a:t>4/2/2020</a:t>
             </a:fld>
             <a:endParaRPr lang="en-US"/>
           </a:p>
@@ -605,7 +605,7 @@
           <a:p>
             <a:fld id="{4F5A968B-4E26-4D02-9FB9-DF6E8F29BEFB}" type="datetimeFigureOut">
               <a:rPr lang="en-US" smtClean="0"/>
-              <a:t>4/1/2020</a:t>
+              <a:t>4/2/2020</a:t>
             </a:fld>
             <a:endParaRPr lang="en-US"/>
           </a:p>
@@ -775,7 +775,7 @@
           <a:p>
             <a:fld id="{4F5A968B-4E26-4D02-9FB9-DF6E8F29BEFB}" type="datetimeFigureOut">
               <a:rPr lang="en-US" smtClean="0"/>
-              <a:t>4/1/2020</a:t>
+              <a:t>4/2/2020</a:t>
             </a:fld>
             <a:endParaRPr lang="en-US"/>
           </a:p>
@@ -1019,7 +1019,7 @@
           <a:p>
             <a:fld id="{4F5A968B-4E26-4D02-9FB9-DF6E8F29BEFB}" type="datetimeFigureOut">
               <a:rPr lang="en-US" smtClean="0"/>
-              <a:t>4/1/2020</a:t>
+              <a:t>4/2/2020</a:t>
             </a:fld>
             <a:endParaRPr lang="en-US"/>
           </a:p>
@@ -1251,7 +1251,7 @@
           <a:p>
             <a:fld id="{4F5A968B-4E26-4D02-9FB9-DF6E8F29BEFB}" type="datetimeFigureOut">
               <a:rPr lang="en-US" smtClean="0"/>
-              <a:t>4/1/2020</a:t>
+              <a:t>4/2/2020</a:t>
             </a:fld>
             <a:endParaRPr lang="en-US"/>
           </a:p>
@@ -1618,7 +1618,7 @@
           <a:p>
             <a:fld id="{4F5A968B-4E26-4D02-9FB9-DF6E8F29BEFB}" type="datetimeFigureOut">
               <a:rPr lang="en-US" smtClean="0"/>
-              <a:t>4/1/2020</a:t>
+              <a:t>4/2/2020</a:t>
             </a:fld>
             <a:endParaRPr lang="en-US"/>
           </a:p>
@@ -1766,7 +1766,7 @@
           <a:p>
             <a:fld id="{4F5A968B-4E26-4D02-9FB9-DF6E8F29BEFB}" type="datetimeFigureOut">
               <a:rPr lang="en-US" smtClean="0"/>
-              <a:t>4/1/2020</a:t>
+              <a:t>4/2/2020</a:t>
             </a:fld>
             <a:endParaRPr lang="en-US"/>
           </a:p>
@@ -2043,7 +2043,7 @@
           <a:p>
             <a:fld id="{4F5A968B-4E26-4D02-9FB9-DF6E8F29BEFB}" type="datetimeFigureOut">
               <a:rPr lang="en-US" smtClean="0"/>
-              <a:t>4/1/2020</a:t>
+              <a:t>4/2/2020</a:t>
             </a:fld>
             <a:endParaRPr lang="en-US"/>
           </a:p>
@@ -2300,7 +2300,7 @@
           <a:p>
             <a:fld id="{4F5A968B-4E26-4D02-9FB9-DF6E8F29BEFB}" type="datetimeFigureOut">
               <a:rPr lang="en-US" smtClean="0"/>
-              <a:t>4/1/2020</a:t>
+              <a:t>4/2/2020</a:t>
             </a:fld>
             <a:endParaRPr lang="en-US"/>
           </a:p>
@@ -2513,7 +2513,7 @@
           <a:p>
             <a:fld id="{4F5A968B-4E26-4D02-9FB9-DF6E8F29BEFB}" type="datetimeFigureOut">
               <a:rPr lang="en-US" smtClean="0"/>
-              <a:t>4/1/2020</a:t>
+              <a:t>4/2/2020</a:t>
             </a:fld>
             <a:endParaRPr lang="en-US"/>
           </a:p>
@@ -2971,7 +2971,7 @@
           </p:cNvPicPr>
           <p:nvPr/>
         </p:nvPicPr>
-        <p:blipFill>
+        <p:blipFill rotWithShape="1">
           <a:blip r:embed="rId2">
             <a:clrChange>
               <a:clrFrom>
@@ -2989,14 +2989,13 @@
               </a:ext>
             </a:extLst>
           </a:blip>
-          <a:stretch>
-            <a:fillRect/>
-          </a:stretch>
+          <a:srcRect r="32937" b="-10448"/>
+          <a:stretch/>
         </p:blipFill>
         <p:spPr>
           <a:xfrm>
-            <a:off x="4106689" y="1343684"/>
-            <a:ext cx="3250407" cy="882742"/>
+            <a:off x="3868237" y="1141479"/>
+            <a:ext cx="2712480" cy="1213222"/>
           </a:xfrm>
           <a:prstGeom prst="rect">
             <a:avLst/>
@@ -3170,319 +3169,330 @@
           </a:p>
         </p:txBody>
       </p:sp>
-      <p:grpSp>
-        <p:nvGrpSpPr>
-          <p:cNvPr id="16" name="Group 15"/>
-          <p:cNvGrpSpPr/>
+      <p:sp>
+        <p:nvSpPr>
+          <p:cNvPr id="5" name="TextBox 4"/>
+          <p:cNvSpPr txBox="1"/>
           <p:nvPr/>
-        </p:nvGrpSpPr>
-        <p:grpSpPr>
+        </p:nvSpPr>
+        <p:spPr>
           <a:xfrm>
-            <a:off x="4347745" y="2389988"/>
-            <a:ext cx="3269784" cy="1820881"/>
-            <a:chOff x="840358" y="4961625"/>
-            <a:chExt cx="3269784" cy="1820881"/>
+            <a:off x="4362083" y="2633360"/>
+            <a:ext cx="3304963" cy="1800493"/>
           </a:xfrm>
-        </p:grpSpPr>
-        <p:sp>
-          <p:nvSpPr>
-            <p:cNvPr id="5" name="TextBox 4"/>
-            <p:cNvSpPr txBox="1"/>
-            <p:nvPr/>
-          </p:nvSpPr>
-          <p:spPr>
-            <a:xfrm>
-              <a:off x="1046184" y="5435984"/>
-              <a:ext cx="3063958" cy="1346522"/>
-            </a:xfrm>
-            <a:prstGeom prst="rect">
-              <a:avLst/>
-            </a:prstGeom>
-            <a:noFill/>
-          </p:spPr>
-          <p:txBody>
-            <a:bodyPr wrap="square" rtlCol="0">
-              <a:spAutoFit/>
-            </a:bodyPr>
-            <a:lstStyle/>
-            <a:p>
-              <a:r>
-                <a:rPr lang="en-US" dirty="0" smtClean="0">
-                  <a:solidFill>
-                    <a:srgbClr val="F60F4E"/>
-                  </a:solidFill>
-                  <a:latin typeface="Arial" panose="020B0604020202020204" pitchFamily="34" charset="0"/>
-                  <a:ea typeface="Gungsuh" panose="02030600000101010101" pitchFamily="18" charset="-127"/>
-                  <a:cs typeface="Arial" panose="020B0604020202020204" pitchFamily="34" charset="0"/>
-                </a:rPr>
-                <a:t>ISOLATE THOSE WHO ARE VISIBLY SICK</a:t>
-              </a:r>
-            </a:p>
-            <a:p>
-              <a:endParaRPr lang="en-US" sz="1200" dirty="0"/>
-            </a:p>
-            <a:p>
-              <a:pPr marL="171450" indent="-171450">
-                <a:buClr>
+          <a:prstGeom prst="rect">
+            <a:avLst/>
+          </a:prstGeom>
+          <a:noFill/>
+        </p:spPr>
+        <p:txBody>
+          <a:bodyPr wrap="square" rtlCol="0">
+            <a:spAutoFit/>
+          </a:bodyPr>
+          <a:lstStyle/>
+          <a:p>
+            <a:r>
+              <a:rPr lang="en-US" dirty="0" smtClean="0">
+                <a:solidFill>
                   <a:srgbClr val="F60F4E"/>
-                </a:buClr>
-                <a:buFont typeface="Wingdings" panose="05000000000000000000" pitchFamily="2" charset="2"/>
-                <a:buChar char="ü"/>
-              </a:pPr>
-              <a:r>
-                <a:rPr lang="en-US" sz="1050" dirty="0" smtClean="0">
-                  <a:solidFill>
-                    <a:srgbClr val="07029D"/>
-                  </a:solidFill>
-                  <a:latin typeface="Arial" panose="020B0604020202020204" pitchFamily="34" charset="0"/>
-                  <a:cs typeface="Arial" panose="020B0604020202020204" pitchFamily="34" charset="0"/>
-                </a:rPr>
-                <a:t> 	STAY </a:t>
-              </a:r>
-              <a:r>
-                <a:rPr lang="en-US" sz="1050" dirty="0">
-                  <a:solidFill>
-                    <a:srgbClr val="07029D"/>
-                  </a:solidFill>
-                  <a:latin typeface="Arial" panose="020B0604020202020204" pitchFamily="34" charset="0"/>
-                  <a:cs typeface="Arial" panose="020B0604020202020204" pitchFamily="34" charset="0"/>
-                </a:rPr>
-                <a:t>IN </a:t>
-              </a:r>
-              <a:r>
-                <a:rPr lang="en-US" sz="1050" dirty="0" smtClean="0">
-                  <a:solidFill>
-                    <a:srgbClr val="07029D"/>
-                  </a:solidFill>
-                  <a:latin typeface="Arial" panose="020B0604020202020204" pitchFamily="34" charset="0"/>
-                  <a:cs typeface="Arial" panose="020B0604020202020204" pitchFamily="34" charset="0"/>
-                </a:rPr>
-                <a:t>THIER </a:t>
-              </a:r>
-              <a:r>
-                <a:rPr lang="en-US" sz="1050" dirty="0">
-                  <a:solidFill>
-                    <a:srgbClr val="07029D"/>
-                  </a:solidFill>
-                  <a:latin typeface="Arial" panose="020B0604020202020204" pitchFamily="34" charset="0"/>
-                  <a:cs typeface="Arial" panose="020B0604020202020204" pitchFamily="34" charset="0"/>
-                </a:rPr>
-                <a:t>OWN ROOM</a:t>
-              </a:r>
-            </a:p>
-            <a:p>
-              <a:pPr marL="171450" indent="-171450">
-                <a:buClr>
-                  <a:srgbClr val="F60F4E"/>
-                </a:buClr>
-                <a:buFont typeface="Wingdings" panose="05000000000000000000" pitchFamily="2" charset="2"/>
-                <a:buChar char="ü"/>
-              </a:pPr>
-              <a:r>
-                <a:rPr lang="en-US" sz="1050" dirty="0" smtClean="0">
-                  <a:solidFill>
-                    <a:srgbClr val="07029D"/>
-                  </a:solidFill>
-                  <a:latin typeface="Arial" panose="020B0604020202020204" pitchFamily="34" charset="0"/>
-                  <a:cs typeface="Arial" panose="020B0604020202020204" pitchFamily="34" charset="0"/>
-                </a:rPr>
-                <a:t>        STAY 6 FEET (2M) AWAY </a:t>
-              </a:r>
-              <a:r>
-                <a:rPr lang="en-US" sz="1050" dirty="0">
-                  <a:solidFill>
-                    <a:srgbClr val="07029D"/>
-                  </a:solidFill>
-                  <a:latin typeface="Arial" panose="020B0604020202020204" pitchFamily="34" charset="0"/>
-                  <a:cs typeface="Arial" panose="020B0604020202020204" pitchFamily="34" charset="0"/>
-                </a:rPr>
-                <a:t>FROM </a:t>
-              </a:r>
-              <a:endParaRPr lang="en-US" sz="1050" dirty="0" smtClean="0">
+                </a:solidFill>
+                <a:latin typeface="Arial" panose="020B0604020202020204" pitchFamily="34" charset="0"/>
+                <a:ea typeface="Gungsuh" panose="02030600000101010101" pitchFamily="18" charset="-127"/>
+                <a:cs typeface="Arial" panose="020B0604020202020204" pitchFamily="34" charset="0"/>
+              </a:rPr>
+              <a:t>ISOLATE THOSE WHO ARE VISIBLY SICK</a:t>
+            </a:r>
+          </a:p>
+          <a:p>
+            <a:endParaRPr lang="en-US" sz="1200" dirty="0"/>
+          </a:p>
+          <a:p>
+            <a:pPr marL="171450" indent="-171450">
+              <a:buClr>
+                <a:srgbClr val="F60F4E"/>
+              </a:buClr>
+              <a:buFont typeface="Wingdings" panose="05000000000000000000" pitchFamily="2" charset="2"/>
+              <a:buChar char="ü"/>
+            </a:pPr>
+            <a:r>
+              <a:rPr lang="en-US" sz="1050" dirty="0" smtClean="0">
                 <a:solidFill>
                   <a:srgbClr val="07029D"/>
                 </a:solidFill>
                 <a:latin typeface="Arial" panose="020B0604020202020204" pitchFamily="34" charset="0"/>
                 <a:cs typeface="Arial" panose="020B0604020202020204" pitchFamily="34" charset="0"/>
-              </a:endParaRPr>
-            </a:p>
-            <a:p>
-              <a:pPr>
-                <a:buClr>
-                  <a:srgbClr val="F60F4E"/>
-                </a:buClr>
-              </a:pPr>
-              <a:r>
-                <a:rPr lang="en-US" sz="1050" dirty="0">
-                  <a:solidFill>
-                    <a:srgbClr val="07029D"/>
-                  </a:solidFill>
-                  <a:latin typeface="Arial" panose="020B0604020202020204" pitchFamily="34" charset="0"/>
-                  <a:cs typeface="Arial" panose="020B0604020202020204" pitchFamily="34" charset="0"/>
-                </a:rPr>
-                <a:t> </a:t>
-              </a:r>
-              <a:r>
-                <a:rPr lang="en-US" sz="1050" dirty="0" smtClean="0">
-                  <a:solidFill>
-                    <a:srgbClr val="07029D"/>
-                  </a:solidFill>
-                  <a:latin typeface="Arial" panose="020B0604020202020204" pitchFamily="34" charset="0"/>
-                  <a:cs typeface="Arial" panose="020B0604020202020204" pitchFamily="34" charset="0"/>
-                </a:rPr>
-                <a:t>              OTHER PEOPLE</a:t>
-              </a:r>
-              <a:endParaRPr lang="en-US" sz="1050" dirty="0">
+              </a:rPr>
+              <a:t>STAY </a:t>
+            </a:r>
+            <a:r>
+              <a:rPr lang="en-US" sz="1050" dirty="0">
                 <a:solidFill>
                   <a:srgbClr val="07029D"/>
                 </a:solidFill>
                 <a:latin typeface="Arial" panose="020B0604020202020204" pitchFamily="34" charset="0"/>
                 <a:cs typeface="Arial" panose="020B0604020202020204" pitchFamily="34" charset="0"/>
-              </a:endParaRPr>
-            </a:p>
-          </p:txBody>
-        </p:sp>
-        <p:sp>
-          <p:nvSpPr>
-            <p:cNvPr id="8" name="TextBox 7"/>
-            <p:cNvSpPr txBox="1"/>
-            <p:nvPr/>
-          </p:nvSpPr>
-          <p:spPr>
-            <a:xfrm>
-              <a:off x="840358" y="4973460"/>
-              <a:ext cx="871664" cy="369332"/>
-            </a:xfrm>
-            <a:prstGeom prst="rect">
-              <a:avLst/>
-            </a:prstGeom>
-            <a:noFill/>
-          </p:spPr>
-          <p:txBody>
-            <a:bodyPr wrap="square" rtlCol="0">
-              <a:spAutoFit/>
-            </a:bodyPr>
-            <a:lstStyle>
-              <a:defPPr>
-                <a:defRPr lang="en-US"/>
-              </a:defPPr>
-              <a:lvl1pPr>
-                <a:defRPr sz="1400">
-                  <a:solidFill>
-                    <a:srgbClr val="07029D"/>
-                  </a:solidFill>
-                  <a:latin typeface="Arial" panose="020B0604020202020204" pitchFamily="34" charset="0"/>
-                  <a:cs typeface="Arial" panose="020B0604020202020204" pitchFamily="34" charset="0"/>
-                </a:defRPr>
-              </a:lvl1pPr>
-            </a:lstStyle>
-            <a:p>
-              <a:pPr algn="ctr"/>
-              <a:r>
-                <a:rPr lang="en-US" sz="900" dirty="0" smtClean="0"/>
-                <a:t>DO: STAY IN BED</a:t>
-              </a:r>
-              <a:endParaRPr lang="en-US" sz="900" dirty="0"/>
-            </a:p>
-          </p:txBody>
-        </p:sp>
-        <p:sp>
-          <p:nvSpPr>
-            <p:cNvPr id="9" name="TextBox 8"/>
-            <p:cNvSpPr txBox="1"/>
-            <p:nvPr/>
-          </p:nvSpPr>
-          <p:spPr>
-            <a:xfrm>
-              <a:off x="1700272" y="4961625"/>
-              <a:ext cx="834401" cy="369332"/>
-            </a:xfrm>
-            <a:prstGeom prst="rect">
-              <a:avLst/>
-            </a:prstGeom>
-            <a:noFill/>
-          </p:spPr>
-          <p:txBody>
-            <a:bodyPr wrap="square" rtlCol="0">
-              <a:spAutoFit/>
-            </a:bodyPr>
-            <a:lstStyle>
-              <a:defPPr>
-                <a:defRPr lang="en-US"/>
-              </a:defPPr>
-              <a:lvl1pPr>
-                <a:defRPr sz="1400">
-                  <a:solidFill>
-                    <a:srgbClr val="07029D"/>
-                  </a:solidFill>
-                  <a:latin typeface="Arial" panose="020B0604020202020204" pitchFamily="34" charset="0"/>
-                  <a:cs typeface="Arial" panose="020B0604020202020204" pitchFamily="34" charset="0"/>
-                </a:defRPr>
-              </a:lvl1pPr>
-            </a:lstStyle>
-            <a:p>
-              <a:pPr algn="ctr"/>
-              <a:r>
-                <a:rPr lang="en-US" sz="900" dirty="0" smtClean="0"/>
-                <a:t>DO: WATCH TV</a:t>
-              </a:r>
-              <a:endParaRPr lang="en-US" sz="900" dirty="0"/>
-            </a:p>
-          </p:txBody>
-        </p:sp>
-        <p:sp>
-          <p:nvSpPr>
-            <p:cNvPr id="10" name="TextBox 9"/>
-            <p:cNvSpPr txBox="1"/>
-            <p:nvPr/>
-          </p:nvSpPr>
-          <p:spPr>
-            <a:xfrm>
-              <a:off x="2478413" y="4988915"/>
-              <a:ext cx="1448722" cy="369332"/>
-            </a:xfrm>
-            <a:prstGeom prst="rect">
-              <a:avLst/>
-            </a:prstGeom>
-            <a:noFill/>
-          </p:spPr>
-          <p:txBody>
-            <a:bodyPr wrap="square" rtlCol="0">
-              <a:spAutoFit/>
-            </a:bodyPr>
-            <a:lstStyle>
-              <a:defPPr>
-                <a:defRPr lang="en-US"/>
-              </a:defPPr>
-              <a:lvl1pPr>
-                <a:defRPr sz="1400">
-                  <a:solidFill>
-                    <a:srgbClr val="07029D"/>
-                  </a:solidFill>
-                  <a:latin typeface="Arial" panose="020B0604020202020204" pitchFamily="34" charset="0"/>
-                  <a:cs typeface="Arial" panose="020B0604020202020204" pitchFamily="34" charset="0"/>
-                </a:defRPr>
-              </a:lvl1pPr>
-            </a:lstStyle>
-            <a:p>
-              <a:pPr algn="ctr"/>
-              <a:r>
-                <a:rPr lang="en-US" sz="900" dirty="0" smtClean="0">
-                  <a:solidFill>
-                    <a:srgbClr val="F60F4E"/>
-                  </a:solidFill>
-                </a:rPr>
-                <a:t>DON’T</a:t>
-              </a:r>
-              <a:r>
-                <a:rPr lang="en-US" sz="900" dirty="0" smtClean="0"/>
-                <a:t>: USE PUBLIC TRANSPORT</a:t>
-              </a:r>
-              <a:endParaRPr lang="en-US" sz="900" dirty="0"/>
-            </a:p>
-          </p:txBody>
-        </p:sp>
-      </p:grpSp>
+              </a:rPr>
+              <a:t>IN </a:t>
+            </a:r>
+            <a:r>
+              <a:rPr lang="en-US" sz="1050" dirty="0" smtClean="0">
+                <a:solidFill>
+                  <a:srgbClr val="07029D"/>
+                </a:solidFill>
+                <a:latin typeface="Arial" panose="020B0604020202020204" pitchFamily="34" charset="0"/>
+                <a:cs typeface="Arial" panose="020B0604020202020204" pitchFamily="34" charset="0"/>
+              </a:rPr>
+              <a:t>THEIR </a:t>
+            </a:r>
+            <a:r>
+              <a:rPr lang="en-US" sz="1050" dirty="0">
+                <a:solidFill>
+                  <a:srgbClr val="07029D"/>
+                </a:solidFill>
+                <a:latin typeface="Arial" panose="020B0604020202020204" pitchFamily="34" charset="0"/>
+                <a:cs typeface="Arial" panose="020B0604020202020204" pitchFamily="34" charset="0"/>
+              </a:rPr>
+              <a:t>OWN ROOM</a:t>
+            </a:r>
+          </a:p>
+          <a:p>
+            <a:pPr marL="171450" indent="-171450">
+              <a:buClr>
+                <a:srgbClr val="F60F4E"/>
+              </a:buClr>
+              <a:buFont typeface="Wingdings" panose="05000000000000000000" pitchFamily="2" charset="2"/>
+              <a:buChar char="ü"/>
+            </a:pPr>
+            <a:r>
+              <a:rPr lang="en-US" sz="1050" dirty="0" smtClean="0">
+                <a:solidFill>
+                  <a:srgbClr val="07029D"/>
+                </a:solidFill>
+                <a:latin typeface="Arial" panose="020B0604020202020204" pitchFamily="34" charset="0"/>
+                <a:cs typeface="Arial" panose="020B0604020202020204" pitchFamily="34" charset="0"/>
+              </a:rPr>
+              <a:t>STAY </a:t>
+            </a:r>
+            <a:r>
+              <a:rPr lang="en-US" sz="1050" dirty="0" smtClean="0">
+                <a:solidFill>
+                  <a:srgbClr val="07029D"/>
+                </a:solidFill>
+                <a:latin typeface="Arial" panose="020B0604020202020204" pitchFamily="34" charset="0"/>
+                <a:cs typeface="Arial" panose="020B0604020202020204" pitchFamily="34" charset="0"/>
+              </a:rPr>
+              <a:t>6 FEET (2M) AWAY </a:t>
+            </a:r>
+            <a:r>
+              <a:rPr lang="en-US" sz="1050" dirty="0">
+                <a:solidFill>
+                  <a:srgbClr val="07029D"/>
+                </a:solidFill>
+                <a:latin typeface="Arial" panose="020B0604020202020204" pitchFamily="34" charset="0"/>
+                <a:cs typeface="Arial" panose="020B0604020202020204" pitchFamily="34" charset="0"/>
+              </a:rPr>
+              <a:t>FROM </a:t>
+            </a:r>
+            <a:endParaRPr lang="en-US" sz="1050" dirty="0" smtClean="0">
+              <a:solidFill>
+                <a:srgbClr val="07029D"/>
+              </a:solidFill>
+              <a:latin typeface="Arial" panose="020B0604020202020204" pitchFamily="34" charset="0"/>
+              <a:cs typeface="Arial" panose="020B0604020202020204" pitchFamily="34" charset="0"/>
+            </a:endParaRPr>
+          </a:p>
+          <a:p>
+            <a:pPr>
+              <a:buClr>
+                <a:srgbClr val="F60F4E"/>
+              </a:buClr>
+            </a:pPr>
+            <a:r>
+              <a:rPr lang="en-US" sz="1050" dirty="0">
+                <a:solidFill>
+                  <a:srgbClr val="07029D"/>
+                </a:solidFill>
+                <a:latin typeface="Arial" panose="020B0604020202020204" pitchFamily="34" charset="0"/>
+                <a:cs typeface="Arial" panose="020B0604020202020204" pitchFamily="34" charset="0"/>
+              </a:rPr>
+              <a:t> </a:t>
+            </a:r>
+            <a:r>
+              <a:rPr lang="en-US" sz="1050" dirty="0" smtClean="0">
+                <a:solidFill>
+                  <a:srgbClr val="07029D"/>
+                </a:solidFill>
+                <a:latin typeface="Arial" panose="020B0604020202020204" pitchFamily="34" charset="0"/>
+                <a:cs typeface="Arial" panose="020B0604020202020204" pitchFamily="34" charset="0"/>
+              </a:rPr>
+              <a:t>    </a:t>
+            </a:r>
+            <a:r>
+              <a:rPr lang="en-US" sz="1050" dirty="0" smtClean="0">
+                <a:solidFill>
+                  <a:srgbClr val="07029D"/>
+                </a:solidFill>
+                <a:latin typeface="Arial" panose="020B0604020202020204" pitchFamily="34" charset="0"/>
+                <a:cs typeface="Arial" panose="020B0604020202020204" pitchFamily="34" charset="0"/>
+              </a:rPr>
+              <a:t>  </a:t>
+            </a:r>
+            <a:r>
+              <a:rPr lang="en-US" sz="1050" dirty="0" smtClean="0">
+                <a:solidFill>
+                  <a:srgbClr val="07029D"/>
+                </a:solidFill>
+                <a:latin typeface="Arial" panose="020B0604020202020204" pitchFamily="34" charset="0"/>
+                <a:cs typeface="Arial" panose="020B0604020202020204" pitchFamily="34" charset="0"/>
+              </a:rPr>
+              <a:t>OTHER </a:t>
+            </a:r>
+            <a:r>
+              <a:rPr lang="en-US" sz="1050" dirty="0" smtClean="0">
+                <a:solidFill>
+                  <a:srgbClr val="07029D"/>
+                </a:solidFill>
+                <a:latin typeface="Arial" panose="020B0604020202020204" pitchFamily="34" charset="0"/>
+                <a:cs typeface="Arial" panose="020B0604020202020204" pitchFamily="34" charset="0"/>
+              </a:rPr>
+              <a:t>PEOPLE</a:t>
+            </a:r>
+          </a:p>
+          <a:p>
+            <a:pPr marL="171450" indent="-171450">
+              <a:buClr>
+                <a:srgbClr val="F60F4E"/>
+              </a:buClr>
+              <a:buFont typeface="Wingdings" panose="05000000000000000000" pitchFamily="2" charset="2"/>
+              <a:buChar char="ü"/>
+            </a:pPr>
+            <a:r>
+              <a:rPr lang="en-US" sz="1050" dirty="0" smtClean="0">
+                <a:solidFill>
+                  <a:srgbClr val="07029D"/>
+                </a:solidFill>
+                <a:latin typeface="Arial" panose="020B0604020202020204" pitchFamily="34" charset="0"/>
+                <a:cs typeface="Arial" panose="020B0604020202020204" pitchFamily="34" charset="0"/>
+              </a:rPr>
+              <a:t>HAVE THEM WEAR A FACE MASK</a:t>
+            </a:r>
+          </a:p>
+          <a:p>
+            <a:pPr marL="171450" indent="-171450">
+              <a:buClr>
+                <a:srgbClr val="F60F4E"/>
+              </a:buClr>
+              <a:buFont typeface="Wingdings" panose="05000000000000000000" pitchFamily="2" charset="2"/>
+              <a:buChar char="ü"/>
+            </a:pPr>
+            <a:r>
+              <a:rPr lang="en-US" sz="1050" dirty="0" smtClean="0">
+                <a:solidFill>
+                  <a:srgbClr val="07029D"/>
+                </a:solidFill>
+                <a:latin typeface="Arial" panose="020B0604020202020204" pitchFamily="34" charset="0"/>
+                <a:cs typeface="Arial" panose="020B0604020202020204" pitchFamily="34" charset="0"/>
+              </a:rPr>
+              <a:t>KEEP PETS AWAY FROM THOSE WHO ARE SICK</a:t>
+            </a:r>
+            <a:endParaRPr lang="en-US" sz="1050" dirty="0">
+              <a:solidFill>
+                <a:srgbClr val="07029D"/>
+              </a:solidFill>
+              <a:latin typeface="Arial" panose="020B0604020202020204" pitchFamily="34" charset="0"/>
+              <a:cs typeface="Arial" panose="020B0604020202020204" pitchFamily="34" charset="0"/>
+            </a:endParaRPr>
+          </a:p>
+        </p:txBody>
+      </p:sp>
+      <p:sp>
+        <p:nvSpPr>
+          <p:cNvPr id="8" name="TextBox 7"/>
+          <p:cNvSpPr txBox="1"/>
+          <p:nvPr/>
+        </p:nvSpPr>
+        <p:spPr>
+          <a:xfrm>
+            <a:off x="4496875" y="2346717"/>
+            <a:ext cx="871664" cy="369332"/>
+          </a:xfrm>
+          <a:prstGeom prst="rect">
+            <a:avLst/>
+          </a:prstGeom>
+          <a:noFill/>
+        </p:spPr>
+        <p:txBody>
+          <a:bodyPr wrap="square" rtlCol="0">
+            <a:spAutoFit/>
+          </a:bodyPr>
+          <a:lstStyle>
+            <a:defPPr>
+              <a:defRPr lang="en-US"/>
+            </a:defPPr>
+            <a:lvl1pPr>
+              <a:defRPr sz="1400">
+                <a:solidFill>
+                  <a:srgbClr val="07029D"/>
+                </a:solidFill>
+                <a:latin typeface="Arial" panose="020B0604020202020204" pitchFamily="34" charset="0"/>
+                <a:cs typeface="Arial" panose="020B0604020202020204" pitchFamily="34" charset="0"/>
+              </a:defRPr>
+            </a:lvl1pPr>
+          </a:lstStyle>
+          <a:p>
+            <a:pPr algn="ctr"/>
+            <a:r>
+              <a:rPr lang="en-US" sz="900" dirty="0" smtClean="0"/>
+              <a:t>DO: STAY IN BED</a:t>
+            </a:r>
+            <a:endParaRPr lang="en-US" sz="900" dirty="0"/>
+          </a:p>
+        </p:txBody>
+      </p:sp>
+      <p:sp>
+        <p:nvSpPr>
+          <p:cNvPr id="9" name="TextBox 8"/>
+          <p:cNvSpPr txBox="1"/>
+          <p:nvPr/>
+        </p:nvSpPr>
+        <p:spPr>
+          <a:xfrm>
+            <a:off x="5356789" y="2334882"/>
+            <a:ext cx="834401" cy="369332"/>
+          </a:xfrm>
+          <a:prstGeom prst="rect">
+            <a:avLst/>
+          </a:prstGeom>
+          <a:noFill/>
+        </p:spPr>
+        <p:txBody>
+          <a:bodyPr wrap="square" rtlCol="0">
+            <a:spAutoFit/>
+          </a:bodyPr>
+          <a:lstStyle>
+            <a:defPPr>
+              <a:defRPr lang="en-US"/>
+            </a:defPPr>
+            <a:lvl1pPr>
+              <a:defRPr sz="1400">
+                <a:solidFill>
+                  <a:srgbClr val="07029D"/>
+                </a:solidFill>
+                <a:latin typeface="Arial" panose="020B0604020202020204" pitchFamily="34" charset="0"/>
+                <a:cs typeface="Arial" panose="020B0604020202020204" pitchFamily="34" charset="0"/>
+              </a:defRPr>
+            </a:lvl1pPr>
+          </a:lstStyle>
+          <a:p>
+            <a:pPr algn="ctr"/>
+            <a:r>
+              <a:rPr lang="en-US" sz="900" dirty="0" smtClean="0"/>
+              <a:t>DO: WATCH TV</a:t>
+            </a:r>
+            <a:endParaRPr lang="en-US" sz="900" dirty="0"/>
+          </a:p>
+        </p:txBody>
+      </p:sp>
       <p:sp>
         <p:nvSpPr>
           <p:cNvPr id="47" name="TextBox 46"/>
@@ -3650,7 +3660,7 @@
         </p:blipFill>
         <p:spPr>
           <a:xfrm>
-            <a:off x="2766341" y="6713885"/>
+            <a:off x="2782947" y="7042341"/>
             <a:ext cx="1018208" cy="1272805"/>
           </a:xfrm>
           <a:prstGeom prst="rect">
@@ -3666,7 +3676,7 @@
         </p:nvGrpSpPr>
         <p:grpSpPr>
           <a:xfrm>
-            <a:off x="2947877" y="5273675"/>
+            <a:off x="2947877" y="5893789"/>
             <a:ext cx="3048000" cy="1255776"/>
             <a:chOff x="4641929" y="951814"/>
             <a:chExt cx="3048000" cy="1255776"/>
@@ -3889,7 +3899,7 @@
         </p:blipFill>
         <p:spPr>
           <a:xfrm>
-            <a:off x="3513939" y="7278682"/>
+            <a:off x="5933702" y="7457981"/>
             <a:ext cx="971093" cy="585659"/>
           </a:xfrm>
           <a:prstGeom prst="rect">
@@ -3969,7 +3979,7 @@
         </p:blipFill>
         <p:spPr>
           <a:xfrm>
-            <a:off x="4957407" y="5527763"/>
+            <a:off x="5005438" y="5856735"/>
             <a:ext cx="3048000" cy="1219200"/>
           </a:xfrm>
           <a:prstGeom prst="rect">
@@ -4181,8 +4191,8 @@
         </p:nvSpPr>
         <p:spPr>
           <a:xfrm>
-            <a:off x="484692" y="2285438"/>
-            <a:ext cx="2350110" cy="369332"/>
+            <a:off x="3196274" y="8834790"/>
+            <a:ext cx="2448834" cy="369332"/>
           </a:xfrm>
           <a:prstGeom prst="rect">
             <a:avLst/>
@@ -4225,8 +4235,8 @@
         </p:nvSpPr>
         <p:spPr>
           <a:xfrm>
-            <a:off x="724708" y="2846978"/>
-            <a:ext cx="1870078" cy="507831"/>
+            <a:off x="3456456" y="9396330"/>
+            <a:ext cx="1948636" cy="507831"/>
           </a:xfrm>
           <a:prstGeom prst="rect">
             <a:avLst/>
@@ -4324,7 +4334,7 @@
         </p:blipFill>
         <p:spPr>
           <a:xfrm>
-            <a:off x="4730480" y="6601972"/>
+            <a:off x="4679869" y="6960559"/>
             <a:ext cx="1094120" cy="1272805"/>
           </a:xfrm>
           <a:prstGeom prst="rect">
@@ -4340,7 +4350,7 @@
         </p:nvSpPr>
         <p:spPr>
           <a:xfrm>
-            <a:off x="2279756" y="8173342"/>
+            <a:off x="275127" y="1707384"/>
             <a:ext cx="4135978" cy="1569660"/>
           </a:xfrm>
           <a:prstGeom prst="rect">
@@ -4523,7 +4533,7 @@
         </p:blipFill>
         <p:spPr>
           <a:xfrm>
-            <a:off x="4913049" y="3940195"/>
+            <a:off x="4867562" y="4316067"/>
             <a:ext cx="2444047" cy="1270023"/>
           </a:xfrm>
           <a:prstGeom prst="rect">
@@ -4563,8 +4573,8 @@
         </p:blipFill>
         <p:spPr>
           <a:xfrm>
-            <a:off x="2313033" y="1890222"/>
-            <a:ext cx="1809630" cy="1269538"/>
+            <a:off x="4957407" y="8439574"/>
+            <a:ext cx="1885649" cy="1269538"/>
           </a:xfrm>
           <a:prstGeom prst="rect">
             <a:avLst/>
@@ -4603,8 +4613,86 @@
         </p:blipFill>
         <p:spPr>
           <a:xfrm>
-            <a:off x="31301" y="1008171"/>
-            <a:ext cx="2449111" cy="1340645"/>
+            <a:off x="723452" y="8563516"/>
+            <a:ext cx="2551993" cy="1340645"/>
+          </a:xfrm>
+          <a:prstGeom prst="rect">
+            <a:avLst/>
+          </a:prstGeom>
+        </p:spPr>
+      </p:pic>
+      <p:sp>
+        <p:nvSpPr>
+          <p:cNvPr id="31" name="TextBox 30"/>
+          <p:cNvSpPr txBox="1"/>
+          <p:nvPr/>
+        </p:nvSpPr>
+        <p:spPr>
+          <a:xfrm>
+            <a:off x="6253451" y="2364610"/>
+            <a:ext cx="955714" cy="369332"/>
+          </a:xfrm>
+          <a:prstGeom prst="rect">
+            <a:avLst/>
+          </a:prstGeom>
+          <a:noFill/>
+        </p:spPr>
+        <p:txBody>
+          <a:bodyPr wrap="square" rtlCol="0">
+            <a:spAutoFit/>
+          </a:bodyPr>
+          <a:lstStyle>
+            <a:defPPr>
+              <a:defRPr lang="en-US"/>
+            </a:defPPr>
+            <a:lvl1pPr>
+              <a:defRPr sz="1400">
+                <a:solidFill>
+                  <a:srgbClr val="07029D"/>
+                </a:solidFill>
+                <a:latin typeface="Arial" panose="020B0604020202020204" pitchFamily="34" charset="0"/>
+                <a:cs typeface="Arial" panose="020B0604020202020204" pitchFamily="34" charset="0"/>
+              </a:defRPr>
+            </a:lvl1pPr>
+          </a:lstStyle>
+          <a:p>
+            <a:pPr algn="ctr"/>
+            <a:r>
+              <a:rPr lang="en-US" sz="900" dirty="0" smtClean="0"/>
+              <a:t>DO: </a:t>
+            </a:r>
+            <a:r>
+              <a:rPr lang="en-US" sz="900" dirty="0" smtClean="0"/>
+              <a:t>WEAR A MASK</a:t>
+            </a:r>
+            <a:endParaRPr lang="en-US" sz="900" dirty="0"/>
+          </a:p>
+        </p:txBody>
+      </p:sp>
+      <p:pic>
+        <p:nvPicPr>
+          <p:cNvPr id="3" name="Picture 2"/>
+          <p:cNvPicPr>
+            <a:picLocks noChangeAspect="1"/>
+          </p:cNvPicPr>
+          <p:nvPr/>
+        </p:nvPicPr>
+        <p:blipFill>
+          <a:blip r:embed="rId13" cstate="print">
+            <a:extLst>
+              <a:ext uri="{28A0092B-C50C-407E-A947-70E740481C1C}">
+                <a14:useLocalDpi xmlns:a14="http://schemas.microsoft.com/office/drawing/2010/main" val="0"/>
+              </a:ext>
+            </a:extLst>
+          </a:blip>
+          <a:stretch>
+            <a:fillRect/>
+          </a:stretch>
+        </p:blipFill>
+        <p:spPr>
+          <a:xfrm>
+            <a:off x="6614281" y="1220970"/>
+            <a:ext cx="605433" cy="1074368"/>
           </a:xfrm>
           <a:prstGeom prst="rect">
             <a:avLst/>

</xml_diff>

<commit_message>
Overhaul of the poster system. Previous versions archived.
</commit_message>
<xml_diff>
--- a/HouseholdInfection/Household_English.pptx
+++ b/HouseholdInfection/Household_English.pptx
@@ -255,7 +255,7 @@
           <a:p>
             <a:fld id="{4F5A968B-4E26-4D02-9FB9-DF6E8F29BEFB}" type="datetimeFigureOut">
               <a:rPr lang="en-US" smtClean="0"/>
-              <a:t>4/2/2020</a:t>
+              <a:t>5/15/2020</a:t>
             </a:fld>
             <a:endParaRPr lang="en-US"/>
           </a:p>
@@ -425,7 +425,7 @@
           <a:p>
             <a:fld id="{4F5A968B-4E26-4D02-9FB9-DF6E8F29BEFB}" type="datetimeFigureOut">
               <a:rPr lang="en-US" smtClean="0"/>
-              <a:t>4/2/2020</a:t>
+              <a:t>5/15/2020</a:t>
             </a:fld>
             <a:endParaRPr lang="en-US"/>
           </a:p>
@@ -605,7 +605,7 @@
           <a:p>
             <a:fld id="{4F5A968B-4E26-4D02-9FB9-DF6E8F29BEFB}" type="datetimeFigureOut">
               <a:rPr lang="en-US" smtClean="0"/>
-              <a:t>4/2/2020</a:t>
+              <a:t>5/15/2020</a:t>
             </a:fld>
             <a:endParaRPr lang="en-US"/>
           </a:p>
@@ -775,7 +775,7 @@
           <a:p>
             <a:fld id="{4F5A968B-4E26-4D02-9FB9-DF6E8F29BEFB}" type="datetimeFigureOut">
               <a:rPr lang="en-US" smtClean="0"/>
-              <a:t>4/2/2020</a:t>
+              <a:t>5/15/2020</a:t>
             </a:fld>
             <a:endParaRPr lang="en-US"/>
           </a:p>
@@ -1019,7 +1019,7 @@
           <a:p>
             <a:fld id="{4F5A968B-4E26-4D02-9FB9-DF6E8F29BEFB}" type="datetimeFigureOut">
               <a:rPr lang="en-US" smtClean="0"/>
-              <a:t>4/2/2020</a:t>
+              <a:t>5/15/2020</a:t>
             </a:fld>
             <a:endParaRPr lang="en-US"/>
           </a:p>
@@ -1251,7 +1251,7 @@
           <a:p>
             <a:fld id="{4F5A968B-4E26-4D02-9FB9-DF6E8F29BEFB}" type="datetimeFigureOut">
               <a:rPr lang="en-US" smtClean="0"/>
-              <a:t>4/2/2020</a:t>
+              <a:t>5/15/2020</a:t>
             </a:fld>
             <a:endParaRPr lang="en-US"/>
           </a:p>
@@ -1618,7 +1618,7 @@
           <a:p>
             <a:fld id="{4F5A968B-4E26-4D02-9FB9-DF6E8F29BEFB}" type="datetimeFigureOut">
               <a:rPr lang="en-US" smtClean="0"/>
-              <a:t>4/2/2020</a:t>
+              <a:t>5/15/2020</a:t>
             </a:fld>
             <a:endParaRPr lang="en-US"/>
           </a:p>
@@ -1766,7 +1766,7 @@
           <a:p>
             <a:fld id="{4F5A968B-4E26-4D02-9FB9-DF6E8F29BEFB}" type="datetimeFigureOut">
               <a:rPr lang="en-US" smtClean="0"/>
-              <a:t>4/2/2020</a:t>
+              <a:t>5/15/2020</a:t>
             </a:fld>
             <a:endParaRPr lang="en-US"/>
           </a:p>
@@ -2043,7 +2043,7 @@
           <a:p>
             <a:fld id="{4F5A968B-4E26-4D02-9FB9-DF6E8F29BEFB}" type="datetimeFigureOut">
               <a:rPr lang="en-US" smtClean="0"/>
-              <a:t>4/2/2020</a:t>
+              <a:t>5/15/2020</a:t>
             </a:fld>
             <a:endParaRPr lang="en-US"/>
           </a:p>
@@ -2300,7 +2300,7 @@
           <a:p>
             <a:fld id="{4F5A968B-4E26-4D02-9FB9-DF6E8F29BEFB}" type="datetimeFigureOut">
               <a:rPr lang="en-US" smtClean="0"/>
-              <a:t>4/2/2020</a:t>
+              <a:t>5/15/2020</a:t>
             </a:fld>
             <a:endParaRPr lang="en-US"/>
           </a:p>
@@ -2513,7 +2513,7 @@
           <a:p>
             <a:fld id="{4F5A968B-4E26-4D02-9FB9-DF6E8F29BEFB}" type="datetimeFigureOut">
               <a:rPr lang="en-US" smtClean="0"/>
-              <a:t>4/2/2020</a:t>
+              <a:t>5/15/2020</a:t>
             </a:fld>
             <a:endParaRPr lang="en-US"/>
           </a:p>
@@ -3271,17 +3271,7 @@
                 <a:latin typeface="Arial" panose="020B0604020202020204" pitchFamily="34" charset="0"/>
                 <a:cs typeface="Arial" panose="020B0604020202020204" pitchFamily="34" charset="0"/>
               </a:rPr>
-              <a:t>STAY </a:t>
-            </a:r>
-            <a:r>
-              <a:rPr lang="en-US" sz="1050" dirty="0" smtClean="0">
-                <a:solidFill>
-                  <a:srgbClr val="07029D"/>
-                </a:solidFill>
-                <a:latin typeface="Arial" panose="020B0604020202020204" pitchFamily="34" charset="0"/>
-                <a:cs typeface="Arial" panose="020B0604020202020204" pitchFamily="34" charset="0"/>
-              </a:rPr>
-              <a:t>6 FEET (2M) AWAY </a:t>
+              <a:t>STAY 6 FEET (2M) AWAY </a:t>
             </a:r>
             <a:r>
               <a:rPr lang="en-US" sz="1050" dirty="0">
@@ -3325,37 +3315,7 @@
                 <a:latin typeface="Arial" panose="020B0604020202020204" pitchFamily="34" charset="0"/>
                 <a:cs typeface="Arial" panose="020B0604020202020204" pitchFamily="34" charset="0"/>
               </a:rPr>
-              <a:t>    </a:t>
-            </a:r>
-            <a:r>
-              <a:rPr lang="en-US" sz="1050" dirty="0" smtClean="0">
-                <a:solidFill>
-                  <a:srgbClr val="07029D"/>
-                </a:solidFill>
-                <a:latin typeface="Arial" panose="020B0604020202020204" pitchFamily="34" charset="0"/>
-                <a:cs typeface="Arial" panose="020B0604020202020204" pitchFamily="34" charset="0"/>
-              </a:rPr>
-              <a:t>  </a:t>
-            </a:r>
-            <a:r>
-              <a:rPr lang="en-US" sz="1050" dirty="0" smtClean="0">
-                <a:solidFill>
-                  <a:srgbClr val="07029D"/>
-                </a:solidFill>
-                <a:latin typeface="Arial" panose="020B0604020202020204" pitchFamily="34" charset="0"/>
-                <a:cs typeface="Arial" panose="020B0604020202020204" pitchFamily="34" charset="0"/>
-              </a:rPr>
-              <a:t>OTHER </a:t>
-            </a:r>
-            <a:r>
-              <a:rPr lang="en-US" sz="1050" dirty="0" smtClean="0">
-                <a:solidFill>
-                  <a:srgbClr val="07029D"/>
-                </a:solidFill>
-                <a:latin typeface="Arial" panose="020B0604020202020204" pitchFamily="34" charset="0"/>
-                <a:cs typeface="Arial" panose="020B0604020202020204" pitchFamily="34" charset="0"/>
-              </a:rPr>
-              <a:t>PEOPLE</a:t>
+              <a:t>      OTHER PEOPLE</a:t>
             </a:r>
           </a:p>
           <a:p>
@@ -4402,7 +4362,37 @@
                 <a:latin typeface="Arial" panose="020B0604020202020204" pitchFamily="34" charset="0"/>
                 <a:cs typeface="Arial" panose="020B0604020202020204" pitchFamily="34" charset="0"/>
               </a:rPr>
-              <a:t>14 DAYS AFTER THE SICK PERSON’S FIRST SYMPTOMS</a:t>
+              <a:t>14 DAYS AFTER THE SICK PERSON’S </a:t>
+            </a:r>
+            <a:r>
+              <a:rPr lang="en-US" sz="1050" dirty="0" smtClean="0">
+                <a:solidFill>
+                  <a:srgbClr val="F60F4E"/>
+                </a:solidFill>
+                <a:latin typeface="Arial" panose="020B0604020202020204" pitchFamily="34" charset="0"/>
+                <a:cs typeface="Arial" panose="020B0604020202020204" pitchFamily="34" charset="0"/>
+              </a:rPr>
+              <a:t>LAST</a:t>
+            </a:r>
+            <a:r>
+              <a:rPr lang="en-US" sz="1050" dirty="0" smtClean="0">
+                <a:solidFill>
+                  <a:srgbClr val="07029D"/>
+                </a:solidFill>
+                <a:latin typeface="Arial" panose="020B0604020202020204" pitchFamily="34" charset="0"/>
+                <a:cs typeface="Arial" panose="020B0604020202020204" pitchFamily="34" charset="0"/>
+              </a:rPr>
+              <a:t> </a:t>
+            </a:r>
+            <a:r>
+              <a:rPr lang="en-US" sz="1050" dirty="0" smtClean="0">
+                <a:solidFill>
+                  <a:srgbClr val="07029D"/>
+                </a:solidFill>
+                <a:latin typeface="Arial" panose="020B0604020202020204" pitchFamily="34" charset="0"/>
+                <a:cs typeface="Arial" panose="020B0604020202020204" pitchFamily="34" charset="0"/>
+              </a:rPr>
+              <a:t>SYMPTOMS</a:t>
             </a:r>
           </a:p>
           <a:p>
@@ -4659,11 +4649,7 @@
             <a:pPr algn="ctr"/>
             <a:r>
               <a:rPr lang="en-US" sz="900" dirty="0" smtClean="0"/>
-              <a:t>DO: </a:t>
-            </a:r>
-            <a:r>
-              <a:rPr lang="en-US" sz="900" dirty="0" smtClean="0"/>
-              <a:t>WEAR A MASK</a:t>
+              <a:t>DO: WEAR A MASK</a:t>
             </a:r>
             <a:endParaRPr lang="en-US" sz="900" dirty="0"/>
           </a:p>

</xml_diff>